<commit_message>
Added RESTful API example.
</commit_message>
<xml_diff>
--- a/Presentations for Visual Studio Code MVA/02.Express.pptx
+++ b/Presentations for Visual Studio Code MVA/02.Express.pptx
@@ -5,10 +5,10 @@
     <p:sldMasterId id="2147483660" r:id="rId4"/>
   </p:sldMasterIdLst>
   <p:notesMasterIdLst>
-    <p:notesMasterId r:id="rId21"/>
+    <p:notesMasterId r:id="rId22"/>
   </p:notesMasterIdLst>
   <p:handoutMasterIdLst>
-    <p:handoutMasterId r:id="rId22"/>
+    <p:handoutMasterId r:id="rId23"/>
   </p:handoutMasterIdLst>
   <p:sldIdLst>
     <p:sldId id="270" r:id="rId5"/>
@@ -24,9 +24,10 @@
     <p:sldId id="279" r:id="rId15"/>
     <p:sldId id="298" r:id="rId16"/>
     <p:sldId id="297" r:id="rId17"/>
-    <p:sldId id="299" r:id="rId18"/>
-    <p:sldId id="283" r:id="rId19"/>
-    <p:sldId id="269" r:id="rId20"/>
+    <p:sldId id="300" r:id="rId18"/>
+    <p:sldId id="299" r:id="rId19"/>
+    <p:sldId id="283" r:id="rId20"/>
+    <p:sldId id="269" r:id="rId21"/>
   </p:sldIdLst>
   <p:sldSz cx="12192000" cy="6858000"/>
   <p:notesSz cx="6858000" cy="9144000"/>
@@ -4460,15 +4461,7 @@
           <a:p>
             <a:r>
               <a:rPr lang="en-US" dirty="0" smtClean="0"/>
-              <a:t>Creating a simple </a:t>
-            </a:r>
-            <a:r>
-              <a:rPr lang="en-US" dirty="0" smtClean="0"/>
-              <a:t>REST API </a:t>
-            </a:r>
-            <a:r>
-              <a:rPr lang="en-US" dirty="0" smtClean="0"/>
-              <a:t>with Express Framework</a:t>
+              <a:t>Creating a simple REST API with Express Framework</a:t>
             </a:r>
             <a:endParaRPr lang="en-US" dirty="0"/>
           </a:p>
@@ -4629,7 +4622,7 @@
       </p:grpSpPr>
       <p:sp>
         <p:nvSpPr>
-          <p:cNvPr id="2" name="Title 1"/>
+          <p:cNvPr id="3" name="Title 2"/>
           <p:cNvSpPr>
             <a:spLocks noGrp="1"/>
           </p:cNvSpPr>
@@ -4644,20 +4637,373 @@
           <a:p>
             <a:r>
               <a:rPr lang="en-US" dirty="0" smtClean="0"/>
-              <a:t>Using Express </a:t>
-            </a:r>
-            <a:r>
-              <a:rPr lang="en-US" smtClean="0"/>
-              <a:t>to build a REST API</a:t>
-            </a:r>
-            <a:endParaRPr lang="en-US"/>
+              <a:t>Building a RESTful API for Dogs</a:t>
+            </a:r>
+            <a:endParaRPr lang="en-US" dirty="0"/>
           </a:p>
         </p:txBody>
       </p:sp>
+      <p:graphicFrame>
+        <p:nvGraphicFramePr>
+          <p:cNvPr id="5" name="Content Placeholder 4"/>
+          <p:cNvGraphicFramePr>
+            <a:graphicFrameLocks noGrp="1"/>
+          </p:cNvGraphicFramePr>
+          <p:nvPr>
+            <p:ph sz="quarter" idx="10"/>
+            <p:extLst>
+              <p:ext uri="{D42A27DB-BD31-4B8C-83A1-F6EECF244321}">
+                <p14:modId xmlns:p14="http://schemas.microsoft.com/office/powerpoint/2010/main" val="4225974341"/>
+              </p:ext>
+            </p:extLst>
+          </p:nvPr>
+        </p:nvGraphicFramePr>
+        <p:xfrm>
+          <a:off x="539463" y="1001843"/>
+          <a:ext cx="11212825" cy="5638800"/>
+        </p:xfrm>
+        <a:graphic>
+          <a:graphicData uri="http://schemas.openxmlformats.org/drawingml/2006/table">
+            <a:tbl>
+              <a:tblPr>
+                <a:tableStyleId>{793D81CF-94F2-401A-BA57-92F5A7B2D0C5}</a:tableStyleId>
+              </a:tblPr>
+              <a:tblGrid>
+                <a:gridCol w="2242565"/>
+                <a:gridCol w="1685041"/>
+                <a:gridCol w="2800089"/>
+                <a:gridCol w="2242565"/>
+                <a:gridCol w="2242565"/>
+              </a:tblGrid>
+              <a:tr h="505443">
+                <a:tc>
+                  <a:txBody>
+                    <a:bodyPr/>
+                    <a:lstStyle/>
+                    <a:p>
+                      <a:r>
+                        <a:rPr lang="en-US" sz="3200" dirty="0"/>
+                        <a:t>Resource</a:t>
+                      </a:r>
+                      <a:endParaRPr lang="en-US" sz="3200" b="1" dirty="0">
+                        <a:latin typeface="Segoe UI Light" panose="020B0502040204020203" pitchFamily="34" charset="0"/>
+                        <a:cs typeface="Segoe UI Light" panose="020B0502040204020203" pitchFamily="34" charset="0"/>
+                      </a:endParaRPr>
+                    </a:p>
+                  </a:txBody>
+                  <a:tcPr anchor="ctr"/>
+                </a:tc>
+                <a:tc>
+                  <a:txBody>
+                    <a:bodyPr/>
+                    <a:lstStyle/>
+                    <a:p>
+                      <a:r>
+                        <a:rPr lang="en-US" sz="3200" dirty="0"/>
+                        <a:t>GET</a:t>
+                      </a:r>
+                      <a:endParaRPr lang="en-US" sz="3200" b="1" dirty="0">
+                        <a:latin typeface="Segoe UI Light" panose="020B0502040204020203" pitchFamily="34" charset="0"/>
+                        <a:cs typeface="Segoe UI Light" panose="020B0502040204020203" pitchFamily="34" charset="0"/>
+                      </a:endParaRPr>
+                    </a:p>
+                  </a:txBody>
+                  <a:tcPr anchor="ctr"/>
+                </a:tc>
+                <a:tc>
+                  <a:txBody>
+                    <a:bodyPr/>
+                    <a:lstStyle/>
+                    <a:p>
+                      <a:r>
+                        <a:rPr lang="en-US" sz="3200" dirty="0"/>
+                        <a:t>PUT</a:t>
+                      </a:r>
+                      <a:endParaRPr lang="en-US" sz="3200" b="1" dirty="0">
+                        <a:latin typeface="Segoe UI Light" panose="020B0502040204020203" pitchFamily="34" charset="0"/>
+                        <a:cs typeface="Segoe UI Light" panose="020B0502040204020203" pitchFamily="34" charset="0"/>
+                      </a:endParaRPr>
+                    </a:p>
+                  </a:txBody>
+                  <a:tcPr anchor="ctr"/>
+                </a:tc>
+                <a:tc>
+                  <a:txBody>
+                    <a:bodyPr/>
+                    <a:lstStyle/>
+                    <a:p>
+                      <a:r>
+                        <a:rPr lang="en-US" sz="3200" dirty="0"/>
+                        <a:t>POST</a:t>
+                      </a:r>
+                      <a:endParaRPr lang="en-US" sz="3200" b="1" dirty="0">
+                        <a:latin typeface="Segoe UI Light" panose="020B0502040204020203" pitchFamily="34" charset="0"/>
+                        <a:cs typeface="Segoe UI Light" panose="020B0502040204020203" pitchFamily="34" charset="0"/>
+                      </a:endParaRPr>
+                    </a:p>
+                  </a:txBody>
+                  <a:tcPr anchor="ctr"/>
+                </a:tc>
+                <a:tc>
+                  <a:txBody>
+                    <a:bodyPr/>
+                    <a:lstStyle/>
+                    <a:p>
+                      <a:r>
+                        <a:rPr lang="en-US" sz="3200" dirty="0"/>
+                        <a:t>DELETE</a:t>
+                      </a:r>
+                      <a:endParaRPr lang="en-US" sz="3200" b="1" dirty="0">
+                        <a:latin typeface="Segoe UI Light" panose="020B0502040204020203" pitchFamily="34" charset="0"/>
+                        <a:cs typeface="Segoe UI Light" panose="020B0502040204020203" pitchFamily="34" charset="0"/>
+                      </a:endParaRPr>
+                    </a:p>
+                  </a:txBody>
+                  <a:tcPr anchor="ctr"/>
+                </a:tc>
+              </a:tr>
+              <a:tr h="2207987">
+                <a:tc>
+                  <a:txBody>
+                    <a:bodyPr/>
+                    <a:lstStyle/>
+                    <a:p>
+                      <a:r>
+                        <a:rPr lang="en-US" sz="3200" dirty="0"/>
+                        <a:t>Collection URI, such as http://</a:t>
+                      </a:r>
+                      <a:r>
+                        <a:rPr lang="en-US" sz="3200" dirty="0" smtClean="0"/>
+                        <a:t>api.example.com/v1/dogs/</a:t>
+                      </a:r>
+                      <a:endParaRPr lang="en-US" sz="3200" dirty="0">
+                        <a:latin typeface="Segoe UI Light" panose="020B0502040204020203" pitchFamily="34" charset="0"/>
+                        <a:cs typeface="Segoe UI Light" panose="020B0502040204020203" pitchFamily="34" charset="0"/>
+                      </a:endParaRPr>
+                    </a:p>
+                  </a:txBody>
+                  <a:tcPr anchor="ctr"/>
+                </a:tc>
+                <a:tc>
+                  <a:txBody>
+                    <a:bodyPr/>
+                    <a:lstStyle/>
+                    <a:p>
+                      <a:r>
+                        <a:rPr lang="en-US" sz="3200" dirty="0" smtClean="0"/>
+                        <a:t>List</a:t>
+                      </a:r>
+                      <a:r>
+                        <a:rPr lang="en-US" sz="3200" baseline="0" dirty="0" smtClean="0"/>
+                        <a:t> all the dogs</a:t>
+                      </a:r>
+                      <a:endParaRPr lang="en-US" sz="3200" dirty="0">
+                        <a:latin typeface="Segoe UI Light" panose="020B0502040204020203" pitchFamily="34" charset="0"/>
+                        <a:cs typeface="Segoe UI Light" panose="020B0502040204020203" pitchFamily="34" charset="0"/>
+                      </a:endParaRPr>
+                    </a:p>
+                  </a:txBody>
+                  <a:tcPr anchor="ctr"/>
+                </a:tc>
+                <a:tc>
+                  <a:txBody>
+                    <a:bodyPr/>
+                    <a:lstStyle/>
+                    <a:p>
+                      <a:r>
+                        <a:rPr lang="en-US" sz="3200" dirty="0"/>
+                        <a:t>Replace </a:t>
+                      </a:r>
+                      <a:r>
+                        <a:rPr lang="en-US" sz="3200" dirty="0" smtClean="0"/>
+                        <a:t>all the</a:t>
+                      </a:r>
+                      <a:r>
+                        <a:rPr lang="en-US" sz="3200" baseline="0" dirty="0" smtClean="0"/>
+                        <a:t> dogs with a new collection of dogs</a:t>
+                      </a:r>
+                      <a:r>
+                        <a:rPr lang="en-US" sz="3200" dirty="0" smtClean="0"/>
+                        <a:t>.</a:t>
+                      </a:r>
+                      <a:endParaRPr lang="en-US" sz="3200" dirty="0">
+                        <a:latin typeface="Segoe UI Light" panose="020B0502040204020203" pitchFamily="34" charset="0"/>
+                        <a:cs typeface="Segoe UI Light" panose="020B0502040204020203" pitchFamily="34" charset="0"/>
+                      </a:endParaRPr>
+                    </a:p>
+                  </a:txBody>
+                  <a:tcPr anchor="ctr"/>
+                </a:tc>
+                <a:tc>
+                  <a:txBody>
+                    <a:bodyPr/>
+                    <a:lstStyle/>
+                    <a:p>
+                      <a:r>
+                        <a:rPr lang="en-US" sz="3200" dirty="0"/>
+                        <a:t>Create a new </a:t>
+                      </a:r>
+                      <a:r>
+                        <a:rPr lang="en-US" sz="3200" dirty="0" smtClean="0"/>
+                        <a:t>dog in </a:t>
+                      </a:r>
+                      <a:r>
+                        <a:rPr lang="en-US" sz="3200" dirty="0"/>
+                        <a:t>the collection. </a:t>
+                      </a:r>
+                      <a:endParaRPr lang="en-US" sz="3200" dirty="0">
+                        <a:latin typeface="Segoe UI Light" panose="020B0502040204020203" pitchFamily="34" charset="0"/>
+                        <a:cs typeface="Segoe UI Light" panose="020B0502040204020203" pitchFamily="34" charset="0"/>
+                      </a:endParaRPr>
+                    </a:p>
+                  </a:txBody>
+                  <a:tcPr anchor="ctr"/>
+                </a:tc>
+                <a:tc>
+                  <a:txBody>
+                    <a:bodyPr/>
+                    <a:lstStyle/>
+                    <a:p>
+                      <a:r>
+                        <a:rPr lang="en-US" sz="3200" dirty="0"/>
+                        <a:t>Delete the entire </a:t>
+                      </a:r>
+                      <a:r>
+                        <a:rPr lang="en-US" sz="3200" dirty="0" smtClean="0"/>
+                        <a:t>dog collection</a:t>
+                      </a:r>
+                      <a:r>
+                        <a:rPr lang="en-US" sz="3200" dirty="0"/>
+                        <a:t>.</a:t>
+                      </a:r>
+                      <a:endParaRPr lang="en-US" sz="3200" dirty="0">
+                        <a:latin typeface="Segoe UI Light" panose="020B0502040204020203" pitchFamily="34" charset="0"/>
+                        <a:cs typeface="Segoe UI Light" panose="020B0502040204020203" pitchFamily="34" charset="0"/>
+                      </a:endParaRPr>
+                    </a:p>
+                  </a:txBody>
+                  <a:tcPr anchor="ctr"/>
+                </a:tc>
+              </a:tr>
+              <a:tr h="2417975">
+                <a:tc>
+                  <a:txBody>
+                    <a:bodyPr/>
+                    <a:lstStyle/>
+                    <a:p>
+                      <a:r>
+                        <a:rPr lang="en-US" sz="3200" dirty="0"/>
+                        <a:t>Element URI, such as http://</a:t>
+                      </a:r>
+                      <a:r>
+                        <a:rPr lang="en-US" sz="3200" dirty="0" smtClean="0"/>
+                        <a:t>api.example.com/v1/dog/1</a:t>
+                      </a:r>
+                      <a:endParaRPr lang="en-US" sz="3200" dirty="0">
+                        <a:latin typeface="Segoe UI Light" panose="020B0502040204020203" pitchFamily="34" charset="0"/>
+                        <a:cs typeface="Segoe UI Light" panose="020B0502040204020203" pitchFamily="34" charset="0"/>
+                      </a:endParaRPr>
+                    </a:p>
+                  </a:txBody>
+                  <a:tcPr anchor="ctr"/>
+                </a:tc>
+                <a:tc>
+                  <a:txBody>
+                    <a:bodyPr/>
+                    <a:lstStyle/>
+                    <a:p>
+                      <a:r>
+                        <a:rPr lang="en-US" sz="3200" dirty="0" smtClean="0"/>
+                        <a:t>Get</a:t>
+                      </a:r>
+                      <a:r>
+                        <a:rPr lang="en-US" sz="3200" baseline="0" dirty="0" smtClean="0"/>
+                        <a:t> a specific dog.</a:t>
+                      </a:r>
+                      <a:endParaRPr lang="en-US" sz="3200" dirty="0">
+                        <a:latin typeface="Segoe UI Light" panose="020B0502040204020203" pitchFamily="34" charset="0"/>
+                        <a:cs typeface="Segoe UI Light" panose="020B0502040204020203" pitchFamily="34" charset="0"/>
+                      </a:endParaRPr>
+                    </a:p>
+                  </a:txBody>
+                  <a:tcPr anchor="ctr"/>
+                </a:tc>
+                <a:tc>
+                  <a:txBody>
+                    <a:bodyPr/>
+                    <a:lstStyle/>
+                    <a:p>
+                      <a:r>
+                        <a:rPr lang="en-US" sz="3200" dirty="0"/>
+                        <a:t>Replace </a:t>
+                      </a:r>
+                      <a:r>
+                        <a:rPr lang="en-US" sz="3200" dirty="0" smtClean="0"/>
+                        <a:t>a dog in the</a:t>
+                      </a:r>
+                      <a:r>
+                        <a:rPr lang="en-US" sz="3200" baseline="0" dirty="0" smtClean="0"/>
+                        <a:t> collection with another dog.</a:t>
+                      </a:r>
+                      <a:endParaRPr lang="en-US" sz="3200" dirty="0">
+                        <a:latin typeface="Segoe UI Light" panose="020B0502040204020203" pitchFamily="34" charset="0"/>
+                        <a:cs typeface="Segoe UI Light" panose="020B0502040204020203" pitchFamily="34" charset="0"/>
+                      </a:endParaRPr>
+                    </a:p>
+                  </a:txBody>
+                  <a:tcPr anchor="ctr"/>
+                </a:tc>
+                <a:tc>
+                  <a:txBody>
+                    <a:bodyPr/>
+                    <a:lstStyle/>
+                    <a:p>
+                      <a:r>
+                        <a:rPr lang="en-US" sz="3200" dirty="0" smtClean="0"/>
+                        <a:t>Not</a:t>
+                      </a:r>
+                      <a:r>
+                        <a:rPr lang="en-US" sz="3200" baseline="0" dirty="0" smtClean="0"/>
+                        <a:t> used.</a:t>
+                      </a:r>
+                      <a:endParaRPr lang="en-US" sz="3200" dirty="0">
+                        <a:latin typeface="Segoe UI Light" panose="020B0502040204020203" pitchFamily="34" charset="0"/>
+                        <a:cs typeface="Segoe UI Light" panose="020B0502040204020203" pitchFamily="34" charset="0"/>
+                      </a:endParaRPr>
+                    </a:p>
+                  </a:txBody>
+                  <a:tcPr anchor="ctr"/>
+                </a:tc>
+                <a:tc>
+                  <a:txBody>
+                    <a:bodyPr/>
+                    <a:lstStyle/>
+                    <a:p>
+                      <a:r>
+                        <a:rPr lang="en-US" sz="3200" dirty="0"/>
+                        <a:t>Delete </a:t>
+                      </a:r>
+                      <a:r>
+                        <a:rPr lang="en-US" sz="3200" dirty="0" smtClean="0"/>
+                        <a:t>the dog from the collection.</a:t>
+                      </a:r>
+                      <a:endParaRPr lang="en-US" sz="3200" dirty="0">
+                        <a:latin typeface="Segoe UI Light" panose="020B0502040204020203" pitchFamily="34" charset="0"/>
+                        <a:cs typeface="Segoe UI Light" panose="020B0502040204020203" pitchFamily="34" charset="0"/>
+                      </a:endParaRPr>
+                    </a:p>
+                  </a:txBody>
+                  <a:tcPr anchor="ctr"/>
+                </a:tc>
+              </a:tr>
+            </a:tbl>
+          </a:graphicData>
+        </a:graphic>
+      </p:graphicFrame>
     </p:spTree>
     <p:extLst>
       <p:ext uri="{BB962C8B-B14F-4D97-AF65-F5344CB8AC3E}">
-        <p14:creationId xmlns:p14="http://schemas.microsoft.com/office/powerpoint/2010/main" val="3963504459"/>
+        <p14:creationId xmlns:p14="http://schemas.microsoft.com/office/powerpoint/2010/main" val="1985210273"/>
       </p:ext>
     </p:extLst>
   </p:cSld>
@@ -4701,6 +5047,67 @@
           <a:p>
             <a:r>
               <a:rPr lang="en-US" dirty="0" smtClean="0"/>
+              <a:t>Using Express to build a </a:t>
+            </a:r>
+            <a:r>
+              <a:rPr lang="en-US" dirty="0" smtClean="0"/>
+              <a:t>RESTful </a:t>
+            </a:r>
+            <a:r>
+              <a:rPr lang="en-US" dirty="0" smtClean="0"/>
+              <a:t>API</a:t>
+            </a:r>
+            <a:endParaRPr lang="en-US" dirty="0"/>
+          </a:p>
+        </p:txBody>
+      </p:sp>
+    </p:spTree>
+    <p:extLst>
+      <p:ext uri="{BB962C8B-B14F-4D97-AF65-F5344CB8AC3E}">
+        <p14:creationId xmlns:p14="http://schemas.microsoft.com/office/powerpoint/2010/main" val="3963504459"/>
+      </p:ext>
+    </p:extLst>
+  </p:cSld>
+  <p:clrMapOvr>
+    <a:masterClrMapping/>
+  </p:clrMapOvr>
+</p:sld>
+</file>
+
+<file path=ppt/slides/slide16.xml><?xml version="1.0" encoding="utf-8"?>
+<p:sld xmlns:a="http://schemas.openxmlformats.org/drawingml/2006/main" xmlns:r="http://schemas.openxmlformats.org/officeDocument/2006/relationships" xmlns:p="http://schemas.openxmlformats.org/presentationml/2006/main">
+  <p:cSld>
+    <p:spTree>
+      <p:nvGrpSpPr>
+        <p:cNvPr id="1" name=""/>
+        <p:cNvGrpSpPr/>
+        <p:nvPr/>
+      </p:nvGrpSpPr>
+      <p:grpSpPr>
+        <a:xfrm>
+          <a:off x="0" y="0"/>
+          <a:ext cx="0" cy="0"/>
+          <a:chOff x="0" y="0"/>
+          <a:chExt cx="0" cy="0"/>
+        </a:xfrm>
+      </p:grpSpPr>
+      <p:sp>
+        <p:nvSpPr>
+          <p:cNvPr id="2" name="Title 1"/>
+          <p:cNvSpPr>
+            <a:spLocks noGrp="1"/>
+          </p:cNvSpPr>
+          <p:nvPr>
+            <p:ph type="title"/>
+          </p:nvPr>
+        </p:nvSpPr>
+        <p:spPr/>
+        <p:txBody>
+          <a:bodyPr/>
+          <a:lstStyle/>
+          <a:p>
+            <a:r>
+              <a:rPr lang="en-US" dirty="0" smtClean="0"/>
               <a:t>Resources</a:t>
             </a:r>
             <a:endParaRPr lang="en-US" dirty="0"/>
@@ -4826,7 +5233,7 @@
 </p:sld>
 </file>
 
-<file path=ppt/slides/slide16.xml><?xml version="1.0" encoding="utf-8"?>
+<file path=ppt/slides/slide17.xml><?xml version="1.0" encoding="utf-8"?>
 <p:sld xmlns:a="http://schemas.openxmlformats.org/drawingml/2006/main" xmlns:r="http://schemas.openxmlformats.org/officeDocument/2006/relationships" xmlns:p="http://schemas.openxmlformats.org/presentationml/2006/main">
   <p:cSld>
     <p:spTree>
@@ -4911,13 +5318,8 @@
           <a:p>
             <a:r>
               <a:rPr lang="en-GB" dirty="0" smtClean="0"/>
-              <a:t>Demo: Creating a simple </a:t>
-            </a:r>
-            <a:r>
-              <a:rPr lang="en-GB" dirty="0" smtClean="0"/>
-              <a:t>REST API </a:t>
-            </a:r>
-            <a:endParaRPr lang="en-GB" dirty="0" smtClean="0"/>
+              <a:t>Demo: Creating a simple REST API </a:t>
+            </a:r>
           </a:p>
           <a:p>
             <a:r>
@@ -5633,11 +6035,7 @@
             <a:pPr marL="914400" indent="-914400"/>
             <a:r>
               <a:rPr lang="en-US" dirty="0" smtClean="0"/>
-              <a:t>02 | Creating a Simple </a:t>
-            </a:r>
-            <a:r>
-              <a:rPr lang="en-US" dirty="0" smtClean="0"/>
-              <a:t>REST API</a:t>
+              <a:t>02 | Creating a Simple REST API</a:t>
             </a:r>
             <a:endParaRPr lang="en-US" dirty="0"/>
           </a:p>
@@ -6772,9 +7170,12 @@
 </file>
 
 <file path=customXml/item1.xml><?xml version="1.0" encoding="utf-8"?>
-<p:properties xmlns:p="http://schemas.microsoft.com/office/2006/metadata/properties" xmlns:xsi="http://www.w3.org/2001/XMLSchema-instance" xmlns:pc="http://schemas.microsoft.com/office/infopath/2007/PartnerControls">
-  <documentManagement/>
-</p:properties>
+<?mso-contentType ?>
+<FormTemplates xmlns="http://schemas.microsoft.com/sharepoint/v3/contenttype/forms">
+  <Display>DocumentLibraryForm</Display>
+  <Edit>DocumentLibraryForm</Edit>
+  <New>DocumentLibraryForm</New>
+</FormTemplates>
 </file>
 
 <file path=customXml/item2.xml><?xml version="1.0" encoding="utf-8"?>
@@ -6918,26 +7319,15 @@
 </file>
 
 <file path=customXml/item3.xml><?xml version="1.0" encoding="utf-8"?>
-<?mso-contentType ?>
-<FormTemplates xmlns="http://schemas.microsoft.com/sharepoint/v3/contenttype/forms">
-  <Display>DocumentLibraryForm</Display>
-  <Edit>DocumentLibraryForm</Edit>
-  <New>DocumentLibraryForm</New>
-</FormTemplates>
+<p:properties xmlns:p="http://schemas.microsoft.com/office/2006/metadata/properties" xmlns:xsi="http://www.w3.org/2001/XMLSchema-instance" xmlns:pc="http://schemas.microsoft.com/office/infopath/2007/PartnerControls">
+  <documentManagement/>
+</p:properties>
 </file>
 
 <file path=customXml/itemProps1.xml><?xml version="1.0" encoding="utf-8"?>
-<ds:datastoreItem xmlns:ds="http://schemas.openxmlformats.org/officeDocument/2006/customXml" ds:itemID="{7025FDD9-4C58-4084-9F89-0E6ADD6FFF55}">
+<ds:datastoreItem xmlns:ds="http://schemas.openxmlformats.org/officeDocument/2006/customXml" ds:itemID="{B0CA13EC-1D3C-4D6F-8D1C-E8A452CFC79A}">
   <ds:schemaRefs>
-    <ds:schemaRef ds:uri="http://schemas.microsoft.com/office/infopath/2007/PartnerControls"/>
-    <ds:schemaRef ds:uri="http://purl.org/dc/elements/1.1/"/>
-    <ds:schemaRef ds:uri="http://schemas.microsoft.com/office/2006/metadata/properties"/>
-    <ds:schemaRef ds:uri="636b0322-90fb-440c-9cbc-22749e7231e9"/>
-    <ds:schemaRef ds:uri="http://purl.org/dc/terms/"/>
-    <ds:schemaRef ds:uri="http://schemas.microsoft.com/office/2006/documentManagement/types"/>
-    <ds:schemaRef ds:uri="http://purl.org/dc/dcmitype/"/>
-    <ds:schemaRef ds:uri="http://schemas.openxmlformats.org/package/2006/metadata/core-properties"/>
-    <ds:schemaRef ds:uri="http://www.w3.org/XML/1998/namespace"/>
+    <ds:schemaRef ds:uri="http://schemas.microsoft.com/sharepoint/v3/contenttype/forms"/>
   </ds:schemaRefs>
 </ds:datastoreItem>
 </file>
@@ -6961,9 +7351,17 @@
 </file>
 
 <file path=customXml/itemProps3.xml><?xml version="1.0" encoding="utf-8"?>
-<ds:datastoreItem xmlns:ds="http://schemas.openxmlformats.org/officeDocument/2006/customXml" ds:itemID="{B0CA13EC-1D3C-4D6F-8D1C-E8A452CFC79A}">
+<ds:datastoreItem xmlns:ds="http://schemas.openxmlformats.org/officeDocument/2006/customXml" ds:itemID="{7025FDD9-4C58-4084-9F89-0E6ADD6FFF55}">
   <ds:schemaRefs>
-    <ds:schemaRef ds:uri="http://schemas.microsoft.com/sharepoint/v3/contenttype/forms"/>
+    <ds:schemaRef ds:uri="http://schemas.microsoft.com/office/infopath/2007/PartnerControls"/>
+    <ds:schemaRef ds:uri="http://purl.org/dc/elements/1.1/"/>
+    <ds:schemaRef ds:uri="http://schemas.microsoft.com/office/2006/metadata/properties"/>
+    <ds:schemaRef ds:uri="636b0322-90fb-440c-9cbc-22749e7231e9"/>
+    <ds:schemaRef ds:uri="http://purl.org/dc/terms/"/>
+    <ds:schemaRef ds:uri="http://schemas.microsoft.com/office/2006/documentManagement/types"/>
+    <ds:schemaRef ds:uri="http://purl.org/dc/dcmitype/"/>
+    <ds:schemaRef ds:uri="http://schemas.openxmlformats.org/package/2006/metadata/core-properties"/>
+    <ds:schemaRef ds:uri="http://www.w3.org/XML/1998/namespace"/>
   </ds:schemaRefs>
 </ds:datastoreItem>
 </file>
</xml_diff>